<commit_message>
Updated presentation to add demo URL
</commit_message>
<xml_diff>
--- a/EducationalGame-TechDaysFinland-2020.pptx
+++ b/EducationalGame-TechDaysFinland-2020.pptx
@@ -266,7 +266,7 @@
           <a:p>
             <a:fld id="{B92AF19A-3A5D-4544-B608-275F196904EE}" type="datetimeFigureOut">
               <a:rPr lang="fi-FI" smtClean="0"/>
-              <a:t>3.3.2020</a:t>
+              <a:t>4.3.2020</a:t>
             </a:fld>
             <a:endParaRPr lang="fi-FI"/>
           </a:p>
@@ -320,7 +320,7 @@
           <a:p>
             <a:fld id="{2FDC2449-95AC-459F-A23E-20B822D35C3B}" type="slidenum">
               <a:rPr lang="fi-FI" smtClean="0"/>
-              <a:t>‹#›</a:t>
+              <a:t>‹nr.›</a:t>
             </a:fld>
             <a:endParaRPr lang="fi-FI"/>
           </a:p>
@@ -464,7 +464,7 @@
           <a:p>
             <a:fld id="{B92AF19A-3A5D-4544-B608-275F196904EE}" type="datetimeFigureOut">
               <a:rPr lang="fi-FI" smtClean="0"/>
-              <a:t>3.3.2020</a:t>
+              <a:t>4.3.2020</a:t>
             </a:fld>
             <a:endParaRPr lang="fi-FI"/>
           </a:p>
@@ -518,7 +518,7 @@
           <a:p>
             <a:fld id="{2FDC2449-95AC-459F-A23E-20B822D35C3B}" type="slidenum">
               <a:rPr lang="fi-FI" smtClean="0"/>
-              <a:t>‹#›</a:t>
+              <a:t>‹nr.›</a:t>
             </a:fld>
             <a:endParaRPr lang="fi-FI"/>
           </a:p>
@@ -672,7 +672,7 @@
           <a:p>
             <a:fld id="{B92AF19A-3A5D-4544-B608-275F196904EE}" type="datetimeFigureOut">
               <a:rPr lang="fi-FI" smtClean="0"/>
-              <a:t>3.3.2020</a:t>
+              <a:t>4.3.2020</a:t>
             </a:fld>
             <a:endParaRPr lang="fi-FI"/>
           </a:p>
@@ -726,7 +726,7 @@
           <a:p>
             <a:fld id="{2FDC2449-95AC-459F-A23E-20B822D35C3B}" type="slidenum">
               <a:rPr lang="fi-FI" smtClean="0"/>
-              <a:t>‹#›</a:t>
+              <a:t>‹nr.›</a:t>
             </a:fld>
             <a:endParaRPr lang="fi-FI"/>
           </a:p>
@@ -908,7 +908,7 @@
           <a:p>
             <a:fld id="{E775D14A-821B-4B49-96E5-E9F4BE48D633}" type="datetimeFigureOut">
               <a:rPr lang="fi-FI" smtClean="0"/>
-              <a:t>3.3.2020</a:t>
+              <a:t>4.3.2020</a:t>
             </a:fld>
             <a:endParaRPr lang="fi-FI"/>
           </a:p>
@@ -978,7 +978,7 @@
           <a:p>
             <a:fld id="{8B530987-778B-43A2-9301-DDB7EE204570}" type="slidenum">
               <a:rPr lang="fi-FI" smtClean="0"/>
-              <a:t>‹#›</a:t>
+              <a:t>‹nr.›</a:t>
             </a:fld>
             <a:endParaRPr lang="fi-FI"/>
           </a:p>
@@ -1148,7 +1148,7 @@
           <a:p>
             <a:fld id="{E775D14A-821B-4B49-96E5-E9F4BE48D633}" type="datetimeFigureOut">
               <a:rPr lang="fi-FI" smtClean="0"/>
-              <a:t>3.3.2020</a:t>
+              <a:t>4.3.2020</a:t>
             </a:fld>
             <a:endParaRPr lang="fi-FI"/>
           </a:p>
@@ -1218,7 +1218,7 @@
           <a:p>
             <a:fld id="{8B530987-778B-43A2-9301-DDB7EE204570}" type="slidenum">
               <a:rPr lang="fi-FI" smtClean="0"/>
-              <a:t>‹#›</a:t>
+              <a:t>‹nr.›</a:t>
             </a:fld>
             <a:endParaRPr lang="fi-FI"/>
           </a:p>
@@ -1454,7 +1454,7 @@
           <a:p>
             <a:fld id="{E775D14A-821B-4B49-96E5-E9F4BE48D633}" type="datetimeFigureOut">
               <a:rPr lang="fi-FI" smtClean="0"/>
-              <a:t>3.3.2020</a:t>
+              <a:t>4.3.2020</a:t>
             </a:fld>
             <a:endParaRPr lang="fi-FI"/>
           </a:p>
@@ -1524,7 +1524,7 @@
           <a:p>
             <a:fld id="{8B530987-778B-43A2-9301-DDB7EE204570}" type="slidenum">
               <a:rPr lang="fi-FI" smtClean="0"/>
-              <a:t>‹#›</a:t>
+              <a:t>‹nr.›</a:t>
             </a:fld>
             <a:endParaRPr lang="fi-FI"/>
           </a:p>
@@ -1760,7 +1760,7 @@
           <a:p>
             <a:fld id="{E775D14A-821B-4B49-96E5-E9F4BE48D633}" type="datetimeFigureOut">
               <a:rPr lang="fi-FI" smtClean="0"/>
-              <a:t>3.3.2020</a:t>
+              <a:t>4.3.2020</a:t>
             </a:fld>
             <a:endParaRPr lang="fi-FI"/>
           </a:p>
@@ -1830,7 +1830,7 @@
           <a:p>
             <a:fld id="{8B530987-778B-43A2-9301-DDB7EE204570}" type="slidenum">
               <a:rPr lang="fi-FI" smtClean="0"/>
-              <a:t>‹#›</a:t>
+              <a:t>‹nr.›</a:t>
             </a:fld>
             <a:endParaRPr lang="fi-FI"/>
           </a:p>
@@ -2214,7 +2214,7 @@
           <a:p>
             <a:fld id="{E775D14A-821B-4B49-96E5-E9F4BE48D633}" type="datetimeFigureOut">
               <a:rPr lang="fi-FI" smtClean="0"/>
-              <a:t>3.3.2020</a:t>
+              <a:t>4.3.2020</a:t>
             </a:fld>
             <a:endParaRPr lang="fi-FI"/>
           </a:p>
@@ -2284,7 +2284,7 @@
           <a:p>
             <a:fld id="{8B530987-778B-43A2-9301-DDB7EE204570}" type="slidenum">
               <a:rPr lang="fi-FI" smtClean="0"/>
-              <a:t>‹#›</a:t>
+              <a:t>‹nr.›</a:t>
             </a:fld>
             <a:endParaRPr lang="fi-FI"/>
           </a:p>
@@ -2388,7 +2388,7 @@
           <a:p>
             <a:fld id="{E775D14A-821B-4B49-96E5-E9F4BE48D633}" type="datetimeFigureOut">
               <a:rPr lang="fi-FI" smtClean="0"/>
-              <a:t>3.3.2020</a:t>
+              <a:t>4.3.2020</a:t>
             </a:fld>
             <a:endParaRPr lang="fi-FI"/>
           </a:p>
@@ -2458,7 +2458,7 @@
           <a:p>
             <a:fld id="{8B530987-778B-43A2-9301-DDB7EE204570}" type="slidenum">
               <a:rPr lang="fi-FI" smtClean="0"/>
-              <a:t>‹#›</a:t>
+              <a:t>‹nr.›</a:t>
             </a:fld>
             <a:endParaRPr lang="fi-FI"/>
           </a:p>
@@ -2525,7 +2525,7 @@
           <a:p>
             <a:fld id="{E775D14A-821B-4B49-96E5-E9F4BE48D633}" type="datetimeFigureOut">
               <a:rPr lang="fi-FI" smtClean="0"/>
-              <a:t>3.3.2020</a:t>
+              <a:t>4.3.2020</a:t>
             </a:fld>
             <a:endParaRPr lang="fi-FI"/>
           </a:p>
@@ -2595,7 +2595,7 @@
           <a:p>
             <a:fld id="{8B530987-778B-43A2-9301-DDB7EE204570}" type="slidenum">
               <a:rPr lang="fi-FI" smtClean="0"/>
-              <a:t>‹#›</a:t>
+              <a:t>‹nr.›</a:t>
             </a:fld>
             <a:endParaRPr lang="fi-FI"/>
           </a:p>
@@ -2871,7 +2871,7 @@
           <a:p>
             <a:fld id="{E775D14A-821B-4B49-96E5-E9F4BE48D633}" type="datetimeFigureOut">
               <a:rPr lang="fi-FI" smtClean="0"/>
-              <a:t>3.3.2020</a:t>
+              <a:t>4.3.2020</a:t>
             </a:fld>
             <a:endParaRPr lang="fi-FI"/>
           </a:p>
@@ -2941,7 +2941,7 @@
           <a:p>
             <a:fld id="{8B530987-778B-43A2-9301-DDB7EE204570}" type="slidenum">
               <a:rPr lang="fi-FI" smtClean="0"/>
-              <a:t>‹#›</a:t>
+              <a:t>‹nr.›</a:t>
             </a:fld>
             <a:endParaRPr lang="fi-FI"/>
           </a:p>
@@ -3085,7 +3085,7 @@
           <a:p>
             <a:fld id="{B92AF19A-3A5D-4544-B608-275F196904EE}" type="datetimeFigureOut">
               <a:rPr lang="fi-FI" smtClean="0"/>
-              <a:t>3.3.2020</a:t>
+              <a:t>4.3.2020</a:t>
             </a:fld>
             <a:endParaRPr lang="fi-FI"/>
           </a:p>
@@ -3139,7 +3139,7 @@
           <a:p>
             <a:fld id="{2FDC2449-95AC-459F-A23E-20B822D35C3B}" type="slidenum">
               <a:rPr lang="fi-FI" smtClean="0"/>
-              <a:t>‹#›</a:t>
+              <a:t>‹nr.›</a:t>
             </a:fld>
             <a:endParaRPr lang="fi-FI"/>
           </a:p>
@@ -3391,7 +3391,7 @@
           <a:p>
             <a:fld id="{E775D14A-821B-4B49-96E5-E9F4BE48D633}" type="datetimeFigureOut">
               <a:rPr lang="fi-FI" smtClean="0"/>
-              <a:t>3.3.2020</a:t>
+              <a:t>4.3.2020</a:t>
             </a:fld>
             <a:endParaRPr lang="fi-FI"/>
           </a:p>
@@ -3461,7 +3461,7 @@
           <a:p>
             <a:fld id="{8B530987-778B-43A2-9301-DDB7EE204570}" type="slidenum">
               <a:rPr lang="fi-FI" smtClean="0"/>
-              <a:t>‹#›</a:t>
+              <a:t>‹nr.›</a:t>
             </a:fld>
             <a:endParaRPr lang="fi-FI"/>
           </a:p>
@@ -3631,7 +3631,7 @@
           <a:p>
             <a:fld id="{E775D14A-821B-4B49-96E5-E9F4BE48D633}" type="datetimeFigureOut">
               <a:rPr lang="fi-FI" smtClean="0"/>
-              <a:t>3.3.2020</a:t>
+              <a:t>4.3.2020</a:t>
             </a:fld>
             <a:endParaRPr lang="fi-FI"/>
           </a:p>
@@ -3701,7 +3701,7 @@
           <a:p>
             <a:fld id="{8B530987-778B-43A2-9301-DDB7EE204570}" type="slidenum">
               <a:rPr lang="fi-FI" smtClean="0"/>
-              <a:t>‹#›</a:t>
+              <a:t>‹nr.›</a:t>
             </a:fld>
             <a:endParaRPr lang="fi-FI"/>
           </a:p>
@@ -3871,7 +3871,7 @@
           <a:p>
             <a:fld id="{E775D14A-821B-4B49-96E5-E9F4BE48D633}" type="datetimeFigureOut">
               <a:rPr lang="fi-FI" smtClean="0"/>
-              <a:t>3.3.2020</a:t>
+              <a:t>4.3.2020</a:t>
             </a:fld>
             <a:endParaRPr lang="fi-FI"/>
           </a:p>
@@ -3941,7 +3941,7 @@
           <a:p>
             <a:fld id="{8B530987-778B-43A2-9301-DDB7EE204570}" type="slidenum">
               <a:rPr lang="fi-FI" smtClean="0"/>
-              <a:t>‹#›</a:t>
+              <a:t>‹nr.›</a:t>
             </a:fld>
             <a:endParaRPr lang="fi-FI"/>
           </a:p>
@@ -4162,7 +4162,7 @@
           <a:p>
             <a:fld id="{B92AF19A-3A5D-4544-B608-275F196904EE}" type="datetimeFigureOut">
               <a:rPr lang="fi-FI" smtClean="0"/>
-              <a:t>3.3.2020</a:t>
+              <a:t>4.3.2020</a:t>
             </a:fld>
             <a:endParaRPr lang="fi-FI"/>
           </a:p>
@@ -4216,7 +4216,7 @@
           <a:p>
             <a:fld id="{2FDC2449-95AC-459F-A23E-20B822D35C3B}" type="slidenum">
               <a:rPr lang="fi-FI" smtClean="0"/>
-              <a:t>‹#›</a:t>
+              <a:t>‹nr.›</a:t>
             </a:fld>
             <a:endParaRPr lang="fi-FI"/>
           </a:p>
@@ -4427,7 +4427,7 @@
           <a:p>
             <a:fld id="{B92AF19A-3A5D-4544-B608-275F196904EE}" type="datetimeFigureOut">
               <a:rPr lang="fi-FI" smtClean="0"/>
-              <a:t>3.3.2020</a:t>
+              <a:t>4.3.2020</a:t>
             </a:fld>
             <a:endParaRPr lang="fi-FI"/>
           </a:p>
@@ -4481,7 +4481,7 @@
           <a:p>
             <a:fld id="{2FDC2449-95AC-459F-A23E-20B822D35C3B}" type="slidenum">
               <a:rPr lang="fi-FI" smtClean="0"/>
-              <a:t>‹#›</a:t>
+              <a:t>‹nr.›</a:t>
             </a:fld>
             <a:endParaRPr lang="fi-FI"/>
           </a:p>
@@ -4839,7 +4839,7 @@
           <a:p>
             <a:fld id="{B92AF19A-3A5D-4544-B608-275F196904EE}" type="datetimeFigureOut">
               <a:rPr lang="fi-FI" smtClean="0"/>
-              <a:t>3.3.2020</a:t>
+              <a:t>4.3.2020</a:t>
             </a:fld>
             <a:endParaRPr lang="fi-FI"/>
           </a:p>
@@ -4893,7 +4893,7 @@
           <a:p>
             <a:fld id="{2FDC2449-95AC-459F-A23E-20B822D35C3B}" type="slidenum">
               <a:rPr lang="fi-FI" smtClean="0"/>
-              <a:t>‹#›</a:t>
+              <a:t>‹nr.›</a:t>
             </a:fld>
             <a:endParaRPr lang="fi-FI"/>
           </a:p>
@@ -4980,7 +4980,7 @@
           <a:p>
             <a:fld id="{B92AF19A-3A5D-4544-B608-275F196904EE}" type="datetimeFigureOut">
               <a:rPr lang="fi-FI" smtClean="0"/>
-              <a:t>3.3.2020</a:t>
+              <a:t>4.3.2020</a:t>
             </a:fld>
             <a:endParaRPr lang="fi-FI"/>
           </a:p>
@@ -5034,7 +5034,7 @@
           <a:p>
             <a:fld id="{2FDC2449-95AC-459F-A23E-20B822D35C3B}" type="slidenum">
               <a:rPr lang="fi-FI" smtClean="0"/>
-              <a:t>‹#›</a:t>
+              <a:t>‹nr.›</a:t>
             </a:fld>
             <a:endParaRPr lang="fi-FI"/>
           </a:p>
@@ -5093,7 +5093,7 @@
           <a:p>
             <a:fld id="{B92AF19A-3A5D-4544-B608-275F196904EE}" type="datetimeFigureOut">
               <a:rPr lang="fi-FI" smtClean="0"/>
-              <a:t>3.3.2020</a:t>
+              <a:t>4.3.2020</a:t>
             </a:fld>
             <a:endParaRPr lang="fi-FI"/>
           </a:p>
@@ -5147,7 +5147,7 @@
           <a:p>
             <a:fld id="{2FDC2449-95AC-459F-A23E-20B822D35C3B}" type="slidenum">
               <a:rPr lang="fi-FI" smtClean="0"/>
-              <a:t>‹#›</a:t>
+              <a:t>‹nr.›</a:t>
             </a:fld>
             <a:endParaRPr lang="fi-FI"/>
           </a:p>
@@ -5404,7 +5404,7 @@
           <a:p>
             <a:fld id="{B92AF19A-3A5D-4544-B608-275F196904EE}" type="datetimeFigureOut">
               <a:rPr lang="fi-FI" smtClean="0"/>
-              <a:t>3.3.2020</a:t>
+              <a:t>4.3.2020</a:t>
             </a:fld>
             <a:endParaRPr lang="fi-FI"/>
           </a:p>
@@ -5458,7 +5458,7 @@
           <a:p>
             <a:fld id="{2FDC2449-95AC-459F-A23E-20B822D35C3B}" type="slidenum">
               <a:rPr lang="fi-FI" smtClean="0"/>
-              <a:t>‹#›</a:t>
+              <a:t>‹nr.›</a:t>
             </a:fld>
             <a:endParaRPr lang="fi-FI"/>
           </a:p>
@@ -5695,7 +5695,7 @@
           <a:p>
             <a:fld id="{B92AF19A-3A5D-4544-B608-275F196904EE}" type="datetimeFigureOut">
               <a:rPr lang="fi-FI" smtClean="0"/>
-              <a:t>3.3.2020</a:t>
+              <a:t>4.3.2020</a:t>
             </a:fld>
             <a:endParaRPr lang="fi-FI"/>
           </a:p>
@@ -5749,7 +5749,7 @@
           <a:p>
             <a:fld id="{2FDC2449-95AC-459F-A23E-20B822D35C3B}" type="slidenum">
               <a:rPr lang="fi-FI" smtClean="0"/>
-              <a:t>‹#›</a:t>
+              <a:t>‹nr.›</a:t>
             </a:fld>
             <a:endParaRPr lang="fi-FI"/>
           </a:p>
@@ -5974,7 +5974,7 @@
           <a:p>
             <a:fld id="{B92AF19A-3A5D-4544-B608-275F196904EE}" type="datetimeFigureOut">
               <a:rPr lang="fi-FI" smtClean="0"/>
-              <a:t>3.3.2020</a:t>
+              <a:t>4.3.2020</a:t>
             </a:fld>
             <a:endParaRPr lang="fi-FI"/>
           </a:p>
@@ -6064,7 +6064,7 @@
           <a:p>
             <a:fld id="{2FDC2449-95AC-459F-A23E-20B822D35C3B}" type="slidenum">
               <a:rPr lang="fi-FI" smtClean="0"/>
-              <a:t>‹#›</a:t>
+              <a:t>‹nr.›</a:t>
             </a:fld>
             <a:endParaRPr lang="fi-FI"/>
           </a:p>
@@ -7158,10 +7158,9 @@
           </a:lstStyle>
           <a:p>
             <a:r>
-              <a:rPr lang="fi-FI" sz="3200" dirty="0" smtClean="0"/>
+              <a:rPr lang="fi-FI" sz="3200" dirty="0"/>
               <a:t>www.involved-it.be</a:t>
             </a:r>
-            <a:endParaRPr lang="fi-FI" sz="3200" dirty="0"/>
           </a:p>
         </p:txBody>
       </p:sp>
@@ -7288,13 +7287,8 @@
             <a:pPr marL="457200" indent="-457200"/>
             <a:r>
               <a:rPr lang="en-US" sz="3200" dirty="0"/>
-              <a:t>Play with the Microsoft Compiler Platform </a:t>
-            </a:r>
-            <a:r>
-              <a:rPr lang="en-US" sz="3200" dirty="0" smtClean="0"/>
-              <a:t>(Roslyn)</a:t>
-            </a:r>
-            <a:endParaRPr lang="en-US" sz="3200" dirty="0"/>
+              <a:t>Play with the Microsoft Compiler Platform (Roslyn)</a:t>
+            </a:r>
           </a:p>
           <a:p>
             <a:pPr marL="457200" indent="-457200"/>
@@ -7463,14 +7457,10 @@
             </a:r>
             <a:r>
               <a:rPr lang="nl-BE" dirty="0"/>
-              <a:t> </a:t>
-            </a:r>
-            <a:r>
-              <a:rPr lang="nl-BE" dirty="0" smtClean="0"/>
-              <a:t>(</a:t>
-            </a:r>
-            <a:r>
-              <a:rPr lang="nl-BE" dirty="0" err="1" smtClean="0"/>
+              <a:t> (</a:t>
+            </a:r>
+            <a:r>
+              <a:rPr lang="nl-BE" dirty="0" err="1"/>
               <a:t>simultaniously</a:t>
             </a:r>
             <a:r>
@@ -7501,22 +7491,21 @@
               <a:t> </a:t>
             </a:r>
             <a:r>
-              <a:rPr lang="nl-BE" dirty="0" err="1" smtClean="0"/>
+              <a:rPr lang="nl-BE" dirty="0" err="1"/>
               <a:t>grid</a:t>
             </a:r>
             <a:r>
-              <a:rPr lang="nl-BE" dirty="0" smtClean="0"/>
+              <a:rPr lang="nl-BE" dirty="0"/>
               <a:t> (walk, turn, </a:t>
             </a:r>
             <a:r>
-              <a:rPr lang="nl-BE" dirty="0" err="1" smtClean="0"/>
+              <a:rPr lang="nl-BE" dirty="0" err="1"/>
               <a:t>teleport</a:t>
             </a:r>
             <a:r>
-              <a:rPr lang="nl-BE" dirty="0" smtClean="0"/>
+              <a:rPr lang="nl-BE" dirty="0"/>
               <a:t>)</a:t>
             </a:r>
-            <a:endParaRPr lang="nl-BE" dirty="0"/>
           </a:p>
           <a:p>
             <a:pPr marL="457200" indent="-457200"/>
@@ -7538,29 +7527,24 @@
             </a:r>
             <a:r>
               <a:rPr lang="nl-BE" dirty="0"/>
-              <a:t> </a:t>
-            </a:r>
-            <a:r>
-              <a:rPr lang="nl-BE" dirty="0" smtClean="0"/>
-              <a:t>robots (</a:t>
-            </a:r>
-            <a:r>
-              <a:rPr lang="nl-BE" dirty="0" err="1" smtClean="0"/>
+              <a:t> robots (</a:t>
+            </a:r>
+            <a:r>
+              <a:rPr lang="nl-BE" dirty="0" err="1"/>
               <a:t>melee</a:t>
             </a:r>
             <a:r>
-              <a:rPr lang="nl-BE" dirty="0" smtClean="0"/>
+              <a:rPr lang="nl-BE" dirty="0"/>
               <a:t>, </a:t>
             </a:r>
             <a:r>
-              <a:rPr lang="nl-BE" dirty="0" err="1" smtClean="0"/>
+              <a:rPr lang="nl-BE" dirty="0" err="1"/>
               <a:t>ranged</a:t>
             </a:r>
             <a:r>
-              <a:rPr lang="nl-BE" dirty="0" smtClean="0"/>
+              <a:rPr lang="nl-BE" dirty="0"/>
               <a:t>)</a:t>
             </a:r>
-            <a:endParaRPr lang="nl-BE" dirty="0"/>
           </a:p>
           <a:p>
             <a:pPr marL="457200" indent="-457200"/>
@@ -7582,21 +7566,16 @@
             </a:r>
             <a:r>
               <a:rPr lang="nl-BE" dirty="0"/>
-              <a:t> </a:t>
-            </a:r>
-            <a:r>
-              <a:rPr lang="nl-BE" dirty="0" smtClean="0"/>
-              <a:t>arena (</a:t>
-            </a:r>
-            <a:r>
-              <a:rPr lang="nl-BE" dirty="0" err="1" smtClean="0"/>
+              <a:t> arena (</a:t>
+            </a:r>
+            <a:r>
+              <a:rPr lang="nl-BE" dirty="0" err="1"/>
               <a:t>vision</a:t>
             </a:r>
             <a:r>
-              <a:rPr lang="nl-BE" dirty="0" smtClean="0"/>
+              <a:rPr lang="nl-BE" dirty="0"/>
               <a:t>)</a:t>
             </a:r>
-            <a:endParaRPr lang="nl-BE" dirty="0"/>
           </a:p>
           <a:p>
             <a:pPr marL="457200" indent="-457200"/>
@@ -7610,21 +7589,16 @@
             </a:r>
             <a:r>
               <a:rPr lang="nl-BE" dirty="0"/>
-              <a:t> using C</a:t>
-            </a:r>
-            <a:r>
-              <a:rPr lang="nl-BE" dirty="0" smtClean="0"/>
-              <a:t># (</a:t>
-            </a:r>
-            <a:r>
-              <a:rPr lang="nl-BE" dirty="0" err="1" smtClean="0"/>
+              <a:t> using C# (</a:t>
+            </a:r>
+            <a:r>
+              <a:rPr lang="nl-BE" dirty="0" err="1"/>
               <a:t>Roslyn</a:t>
             </a:r>
             <a:r>
-              <a:rPr lang="nl-BE" dirty="0" smtClean="0"/>
+              <a:rPr lang="nl-BE" dirty="0"/>
               <a:t>)</a:t>
             </a:r>
-            <a:endParaRPr lang="nl-BE" dirty="0"/>
           </a:p>
           <a:p>
             <a:pPr marL="457200" indent="-457200"/>
@@ -11533,6 +11507,52 @@
           </a:prstGeom>
         </p:spPr>
       </p:pic>
+      <p:sp>
+        <p:nvSpPr>
+          <p:cNvPr id="4" name="Tekstvak 3">
+            <a:extLst>
+              <a:ext uri="{FF2B5EF4-FFF2-40B4-BE49-F238E27FC236}">
+                <a16:creationId xmlns:a16="http://schemas.microsoft.com/office/drawing/2014/main" id="{1EFA9EA9-7708-4A9F-9C21-C94FDCAF94FA}"/>
+              </a:ext>
+            </a:extLst>
+          </p:cNvPr>
+          <p:cNvSpPr txBox="1"/>
+          <p:nvPr/>
+        </p:nvSpPr>
+        <p:spPr>
+          <a:xfrm>
+            <a:off x="611042" y="5790360"/>
+            <a:ext cx="4553875" cy="523220"/>
+          </a:xfrm>
+          <a:prstGeom prst="rect">
+            <a:avLst/>
+          </a:prstGeom>
+          <a:noFill/>
+          <a:effectLst>
+            <a:outerShdw blurRad="50800" dist="38100" dir="2700000" algn="tl" rotWithShape="0">
+              <a:prstClr val="black">
+                <a:alpha val="40000"/>
+              </a:prstClr>
+            </a:outerShdw>
+          </a:effectLst>
+        </p:spPr>
+        <p:txBody>
+          <a:bodyPr wrap="none" rtlCol="0">
+            <a:spAutoFit/>
+          </a:bodyPr>
+          <a:lstStyle/>
+          <a:p>
+            <a:r>
+              <a:rPr lang="nl-BE" sz="2800" dirty="0">
+                <a:solidFill>
+                  <a:schemeClr val="bg1"/>
+                </a:solidFill>
+              </a:rPr>
+              <a:t>https://api.djohnnie.be:8802/</a:t>
+            </a:r>
+          </a:p>
+        </p:txBody>
+      </p:sp>
     </p:spTree>
     <p:extLst>
       <p:ext uri="{BB962C8B-B14F-4D97-AF65-F5344CB8AC3E}">
@@ -11643,9 +11663,22 @@
               <a:buNone/>
             </a:pPr>
             <a:r>
-              <a:rPr lang="nl-BE" dirty="0" smtClean="0"/>
+              <a:rPr lang="nl-BE" dirty="0"/>
               <a:t>johnny.hooyberghs@involved-it.be</a:t>
             </a:r>
+          </a:p>
+          <a:p>
+            <a:pPr marL="0" indent="0" algn="ctr">
+              <a:buNone/>
+            </a:pPr>
+            <a:r>
+              <a:rPr lang="nl-BE" dirty="0"/>
+              <a:t>@</a:t>
+            </a:r>
+            <a:r>
+              <a:rPr lang="nl-BE" dirty="0" err="1"/>
+              <a:t>djohnnieke</a:t>
+            </a:r>
             <a:endParaRPr lang="nl-BE" dirty="0"/>
           </a:p>
           <a:p>
@@ -11653,26 +11686,8 @@
               <a:buNone/>
             </a:pPr>
             <a:r>
-              <a:rPr lang="nl-BE" dirty="0" smtClean="0"/>
-              <a:t>@</a:t>
-            </a:r>
-            <a:r>
-              <a:rPr lang="nl-BE" dirty="0" err="1" smtClean="0"/>
-              <a:t>djohnnieke</a:t>
-            </a:r>
-            <a:endParaRPr lang="nl-BE" dirty="0" smtClean="0"/>
-          </a:p>
-          <a:p>
-            <a:pPr marL="0" indent="0" algn="ctr">
-              <a:buNone/>
-            </a:pPr>
-            <a:r>
               <a:rPr lang="nl-BE" dirty="0"/>
-              <a:t>https://</a:t>
-            </a:r>
-            <a:r>
-              <a:rPr lang="nl-BE" dirty="0" smtClean="0"/>
-              <a:t>github.com/Djohnnie</a:t>
+              <a:t>https://github.com/Djohnnie</a:t>
             </a:r>
           </a:p>
           <a:p>
@@ -11683,7 +11698,6 @@
               <a:rPr lang="nl-BE" dirty="0"/>
               <a:t>https://github.com/Djohnnie/CSharpWars-TechDaysFinland-2020</a:t>
             </a:r>
-            <a:endParaRPr lang="nl-BE" dirty="0"/>
           </a:p>
         </p:txBody>
       </p:sp>
@@ -11977,10 +11991,9 @@
           </a:lstStyle>
           <a:p>
             <a:r>
-              <a:rPr lang="fi-FI" sz="3200" dirty="0" smtClean="0"/>
+              <a:rPr lang="fi-FI" sz="3200" dirty="0"/>
               <a:t>www.involved-it.be</a:t>
             </a:r>
-            <a:endParaRPr lang="fi-FI" sz="3200" dirty="0"/>
           </a:p>
         </p:txBody>
       </p:sp>
@@ -12100,9 +12113,22 @@
               <a:buNone/>
             </a:pPr>
             <a:r>
-              <a:rPr lang="nl-BE" dirty="0" smtClean="0"/>
+              <a:rPr lang="nl-BE" dirty="0"/>
               <a:t>johnny.hooyberghs@involved-it.be</a:t>
             </a:r>
+          </a:p>
+          <a:p>
+            <a:pPr marL="0" indent="0" algn="ctr">
+              <a:buNone/>
+            </a:pPr>
+            <a:r>
+              <a:rPr lang="nl-BE" dirty="0"/>
+              <a:t>@</a:t>
+            </a:r>
+            <a:r>
+              <a:rPr lang="nl-BE" dirty="0" err="1"/>
+              <a:t>djohnnieke</a:t>
+            </a:r>
             <a:endParaRPr lang="nl-BE" dirty="0"/>
           </a:p>
           <a:p>
@@ -12110,26 +12136,8 @@
               <a:buNone/>
             </a:pPr>
             <a:r>
-              <a:rPr lang="nl-BE" dirty="0" smtClean="0"/>
-              <a:t>@</a:t>
-            </a:r>
-            <a:r>
-              <a:rPr lang="nl-BE" dirty="0" err="1" smtClean="0"/>
-              <a:t>djohnnieke</a:t>
-            </a:r>
-            <a:endParaRPr lang="nl-BE" dirty="0" smtClean="0"/>
-          </a:p>
-          <a:p>
-            <a:pPr marL="0" indent="0" algn="ctr">
-              <a:buNone/>
-            </a:pPr>
-            <a:r>
               <a:rPr lang="nl-BE" dirty="0"/>
-              <a:t>https://</a:t>
-            </a:r>
-            <a:r>
-              <a:rPr lang="nl-BE" dirty="0" smtClean="0"/>
-              <a:t>github.com/Djohnnie</a:t>
+              <a:t>https://github.com/Djohnnie</a:t>
             </a:r>
           </a:p>
           <a:p>
@@ -12140,7 +12148,6 @@
               <a:rPr lang="nl-BE" dirty="0"/>
               <a:t>https://github.com/Djohnnie/CSharpWars-TechDaysFinland-2020</a:t>
             </a:r>
-            <a:endParaRPr lang="nl-BE" dirty="0"/>
           </a:p>
         </p:txBody>
       </p:sp>
@@ -12434,10 +12441,9 @@
           </a:lstStyle>
           <a:p>
             <a:r>
-              <a:rPr lang="fi-FI" sz="3200" dirty="0" smtClean="0"/>
+              <a:rPr lang="fi-FI" sz="3200" dirty="0"/>
               <a:t>www.involved-it.be</a:t>
             </a:r>
-            <a:endParaRPr lang="fi-FI" sz="3200" dirty="0"/>
           </a:p>
         </p:txBody>
       </p:sp>
@@ -13082,6 +13088,21 @@
 </file>
 
 <file path=customXml/item1.xml><?xml version="1.0" encoding="utf-8"?>
+<?mso-contentType ?>
+<FormTemplates xmlns="http://schemas.microsoft.com/sharepoint/v3/contenttype/forms">
+  <Display>DocumentLibraryForm</Display>
+  <Edit>DocumentLibraryForm</Edit>
+  <New>DocumentLibraryForm</New>
+</FormTemplates>
+</file>
+
+<file path=customXml/item2.xml><?xml version="1.0" encoding="utf-8"?>
+<p:properties xmlns:p="http://schemas.microsoft.com/office/2006/metadata/properties" xmlns:xsi="http://www.w3.org/2001/XMLSchema-instance" xmlns:pc="http://schemas.microsoft.com/office/infopath/2007/PartnerControls">
+  <documentManagement/>
+</p:properties>
+</file>
+
+<file path=customXml/item3.xml><?xml version="1.0" encoding="utf-8"?>
 <ct:contentTypeSchema xmlns:ct="http://schemas.microsoft.com/office/2006/metadata/contentType" xmlns:ma="http://schemas.microsoft.com/office/2006/metadata/properties/metaAttributes" ct:_="" ma:_="" ma:contentTypeName="Asiakirja" ma:contentTypeID="0x010100AD3B108813893342A29AE786A13A103D" ma:contentTypeVersion="13" ma:contentTypeDescription="Luo uusi asiakirja." ma:contentTypeScope="" ma:versionID="6a0283d9cdd2e5f75042720ea40fd066">
   <xsd:schema xmlns:xsd="http://www.w3.org/2001/XMLSchema" xmlns:xs="http://www.w3.org/2001/XMLSchema" xmlns:p="http://schemas.microsoft.com/office/2006/metadata/properties" xmlns:ns3="056cce87-014d-41bc-9da7-4bab5e65d043" xmlns:ns4="53d80cf1-60ec-4234-9036-b6961cba4c45" targetNamespace="http://schemas.microsoft.com/office/2006/metadata/properties" ma:root="true" ma:fieldsID="5630c78c50fa8eb1d02b9a760dde0348" ns3:_="" ns4:_="">
     <xsd:import namespace="056cce87-014d-41bc-9da7-4bab5e65d043"/>
@@ -13304,36 +13325,10 @@
 </ct:contentTypeSchema>
 </file>
 
-<file path=customXml/item2.xml><?xml version="1.0" encoding="utf-8"?>
-<p:properties xmlns:p="http://schemas.microsoft.com/office/2006/metadata/properties" xmlns:xsi="http://www.w3.org/2001/XMLSchema-instance" xmlns:pc="http://schemas.microsoft.com/office/infopath/2007/PartnerControls">
-  <documentManagement/>
-</p:properties>
-</file>
-
-<file path=customXml/item3.xml><?xml version="1.0" encoding="utf-8"?>
-<?mso-contentType ?>
-<FormTemplates xmlns="http://schemas.microsoft.com/sharepoint/v3/contenttype/forms">
-  <Display>DocumentLibraryForm</Display>
-  <Edit>DocumentLibraryForm</Edit>
-  <New>DocumentLibraryForm</New>
-</FormTemplates>
-</file>
-
 <file path=customXml/itemProps1.xml><?xml version="1.0" encoding="utf-8"?>
-<ds:datastoreItem xmlns:ds="http://schemas.openxmlformats.org/officeDocument/2006/customXml" ds:itemID="{370C2BF7-C2D6-4517-B6DF-FFC616A54AA4}">
+<ds:datastoreItem xmlns:ds="http://schemas.openxmlformats.org/officeDocument/2006/customXml" ds:itemID="{76CA5F9D-BF38-41BB-B2AC-B24301EB97E5}">
   <ds:schemaRefs>
-    <ds:schemaRef ds:uri="http://schemas.microsoft.com/office/2006/metadata/contentType"/>
-    <ds:schemaRef ds:uri="http://schemas.microsoft.com/office/2006/metadata/properties/metaAttributes"/>
-    <ds:schemaRef ds:uri="http://www.w3.org/2001/XMLSchema"/>
-    <ds:schemaRef ds:uri="http://schemas.microsoft.com/office/2006/metadata/properties"/>
-    <ds:schemaRef ds:uri="056cce87-014d-41bc-9da7-4bab5e65d043"/>
-    <ds:schemaRef ds:uri="53d80cf1-60ec-4234-9036-b6961cba4c45"/>
-    <ds:schemaRef ds:uri="http://schemas.microsoft.com/office/2006/documentManagement/types"/>
-    <ds:schemaRef ds:uri="http://schemas.microsoft.com/office/infopath/2007/PartnerControls"/>
-    <ds:schemaRef ds:uri="http://schemas.openxmlformats.org/package/2006/metadata/core-properties"/>
-    <ds:schemaRef ds:uri="http://purl.org/dc/elements/1.1/"/>
-    <ds:schemaRef ds:uri="http://purl.org/dc/terms/"/>
-    <ds:schemaRef ds:uri="http://schemas.microsoft.com/internal/obd"/>
+    <ds:schemaRef ds:uri="http://schemas.microsoft.com/sharepoint/v3/contenttype/forms"/>
   </ds:schemaRefs>
 </ds:datastoreItem>
 </file>
@@ -13356,9 +13351,20 @@
 </file>
 
 <file path=customXml/itemProps3.xml><?xml version="1.0" encoding="utf-8"?>
-<ds:datastoreItem xmlns:ds="http://schemas.openxmlformats.org/officeDocument/2006/customXml" ds:itemID="{76CA5F9D-BF38-41BB-B2AC-B24301EB97E5}">
+<ds:datastoreItem xmlns:ds="http://schemas.openxmlformats.org/officeDocument/2006/customXml" ds:itemID="{370C2BF7-C2D6-4517-B6DF-FFC616A54AA4}">
   <ds:schemaRefs>
-    <ds:schemaRef ds:uri="http://schemas.microsoft.com/sharepoint/v3/contenttype/forms"/>
+    <ds:schemaRef ds:uri="http://schemas.microsoft.com/office/2006/metadata/contentType"/>
+    <ds:schemaRef ds:uri="http://schemas.microsoft.com/office/2006/metadata/properties/metaAttributes"/>
+    <ds:schemaRef ds:uri="http://www.w3.org/2001/XMLSchema"/>
+    <ds:schemaRef ds:uri="http://schemas.microsoft.com/office/2006/metadata/properties"/>
+    <ds:schemaRef ds:uri="056cce87-014d-41bc-9da7-4bab5e65d043"/>
+    <ds:schemaRef ds:uri="53d80cf1-60ec-4234-9036-b6961cba4c45"/>
+    <ds:schemaRef ds:uri="http://schemas.microsoft.com/office/2006/documentManagement/types"/>
+    <ds:schemaRef ds:uri="http://schemas.microsoft.com/office/infopath/2007/PartnerControls"/>
+    <ds:schemaRef ds:uri="http://schemas.openxmlformats.org/package/2006/metadata/core-properties"/>
+    <ds:schemaRef ds:uri="http://purl.org/dc/elements/1.1/"/>
+    <ds:schemaRef ds:uri="http://purl.org/dc/terms/"/>
+    <ds:schemaRef ds:uri="http://schemas.microsoft.com/internal/obd"/>
   </ds:schemaRefs>
 </ds:datastoreItem>
 </file>
</xml_diff>